<commit_message>
add convert to pic FT case
</commit_message>
<xml_diff>
--- a/doc/test/ConvertToPicture.pptx
+++ b/doc/test/ConvertToPicture.pptx
@@ -239,7 +239,7 @@
           <a:p>
             <a:fld id="{26004F41-C1A1-4B0D-9EEE-5E3F0E5BC108}" type="datetimeFigureOut">
               <a:rPr lang="en-SG" smtClean="0"/>
-              <a:t>26/3/2014</a:t>
+              <a:t>11/6/2015</a:t>
             </a:fld>
             <a:endParaRPr lang="en-SG"/>
           </a:p>
@@ -688,7 +688,7 @@
           <a:p>
             <a:fld id="{699DC775-C286-4358-8C92-D7E584E969B3}" type="datetimeFigureOut">
               <a:rPr lang="en-US" smtClean="0"/>
-              <a:t>3/26/2014</a:t>
+              <a:t>6/11/2015</a:t>
             </a:fld>
             <a:endParaRPr lang="en-US"/>
           </a:p>
@@ -858,7 +858,7 @@
           <a:p>
             <a:fld id="{699DC775-C286-4358-8C92-D7E584E969B3}" type="datetimeFigureOut">
               <a:rPr lang="en-US" smtClean="0"/>
-              <a:t>3/26/2014</a:t>
+              <a:t>6/11/2015</a:t>
             </a:fld>
             <a:endParaRPr lang="en-US"/>
           </a:p>
@@ -1038,7 +1038,7 @@
           <a:p>
             <a:fld id="{699DC775-C286-4358-8C92-D7E584E969B3}" type="datetimeFigureOut">
               <a:rPr lang="en-US" smtClean="0"/>
-              <a:t>3/26/2014</a:t>
+              <a:t>6/11/2015</a:t>
             </a:fld>
             <a:endParaRPr lang="en-US"/>
           </a:p>
@@ -1280,7 +1280,7 @@
           <a:p>
             <a:fld id="{699DC775-C286-4358-8C92-D7E584E969B3}" type="datetimeFigureOut">
               <a:rPr lang="en-US" smtClean="0"/>
-              <a:t>3/26/2014</a:t>
+              <a:t>6/11/2015</a:t>
             </a:fld>
             <a:endParaRPr lang="en-US"/>
           </a:p>
@@ -1450,7 +1450,7 @@
           <a:p>
             <a:fld id="{699DC775-C286-4358-8C92-D7E584E969B3}" type="datetimeFigureOut">
               <a:rPr lang="en-US" smtClean="0"/>
-              <a:t>3/26/2014</a:t>
+              <a:t>6/11/2015</a:t>
             </a:fld>
             <a:endParaRPr lang="en-US"/>
           </a:p>
@@ -1696,7 +1696,7 @@
           <a:p>
             <a:fld id="{699DC775-C286-4358-8C92-D7E584E969B3}" type="datetimeFigureOut">
               <a:rPr lang="en-US" smtClean="0"/>
-              <a:t>3/26/2014</a:t>
+              <a:t>6/11/2015</a:t>
             </a:fld>
             <a:endParaRPr lang="en-US"/>
           </a:p>
@@ -1984,7 +1984,7 @@
           <a:p>
             <a:fld id="{699DC775-C286-4358-8C92-D7E584E969B3}" type="datetimeFigureOut">
               <a:rPr lang="en-US" smtClean="0"/>
-              <a:t>3/26/2014</a:t>
+              <a:t>6/11/2015</a:t>
             </a:fld>
             <a:endParaRPr lang="en-US"/>
           </a:p>
@@ -2406,7 +2406,7 @@
           <a:p>
             <a:fld id="{699DC775-C286-4358-8C92-D7E584E969B3}" type="datetimeFigureOut">
               <a:rPr lang="en-US" smtClean="0"/>
-              <a:t>3/26/2014</a:t>
+              <a:t>6/11/2015</a:t>
             </a:fld>
             <a:endParaRPr lang="en-US"/>
           </a:p>
@@ -2524,7 +2524,7 @@
           <a:p>
             <a:fld id="{699DC775-C286-4358-8C92-D7E584E969B3}" type="datetimeFigureOut">
               <a:rPr lang="en-US" smtClean="0"/>
-              <a:t>3/26/2014</a:t>
+              <a:t>6/11/2015</a:t>
             </a:fld>
             <a:endParaRPr lang="en-US"/>
           </a:p>
@@ -2619,7 +2619,7 @@
           <a:p>
             <a:fld id="{699DC775-C286-4358-8C92-D7E584E969B3}" type="datetimeFigureOut">
               <a:rPr lang="en-US" smtClean="0"/>
-              <a:t>3/26/2014</a:t>
+              <a:t>6/11/2015</a:t>
             </a:fld>
             <a:endParaRPr lang="en-US"/>
           </a:p>
@@ -2896,7 +2896,7 @@
           <a:p>
             <a:fld id="{699DC775-C286-4358-8C92-D7E584E969B3}" type="datetimeFigureOut">
               <a:rPr lang="en-US" smtClean="0"/>
-              <a:t>3/26/2014</a:t>
+              <a:t>6/11/2015</a:t>
             </a:fld>
             <a:endParaRPr lang="en-US"/>
           </a:p>
@@ -3066,7 +3066,7 @@
           <a:p>
             <a:fld id="{699DC775-C286-4358-8C92-D7E584E969B3}" type="datetimeFigureOut">
               <a:rPr lang="en-US" smtClean="0"/>
-              <a:t>3/26/2014</a:t>
+              <a:t>6/11/2015</a:t>
             </a:fld>
             <a:endParaRPr lang="en-US"/>
           </a:p>
@@ -3319,7 +3319,7 @@
           <a:p>
             <a:fld id="{699DC775-C286-4358-8C92-D7E584E969B3}" type="datetimeFigureOut">
               <a:rPr lang="en-US" smtClean="0"/>
-              <a:t>3/26/2014</a:t>
+              <a:t>6/11/2015</a:t>
             </a:fld>
             <a:endParaRPr lang="en-US"/>
           </a:p>
@@ -3489,7 +3489,7 @@
           <a:p>
             <a:fld id="{699DC775-C286-4358-8C92-D7E584E969B3}" type="datetimeFigureOut">
               <a:rPr lang="en-US" smtClean="0"/>
-              <a:t>3/26/2014</a:t>
+              <a:t>6/11/2015</a:t>
             </a:fld>
             <a:endParaRPr lang="en-US"/>
           </a:p>
@@ -3669,7 +3669,7 @@
           <a:p>
             <a:fld id="{699DC775-C286-4358-8C92-D7E584E969B3}" type="datetimeFigureOut">
               <a:rPr lang="en-US" smtClean="0"/>
-              <a:t>3/26/2014</a:t>
+              <a:t>6/11/2015</a:t>
             </a:fld>
             <a:endParaRPr lang="en-US"/>
           </a:p>
@@ -3919,7 +3919,7 @@
           <a:p>
             <a:fld id="{699DC775-C286-4358-8C92-D7E584E969B3}" type="datetimeFigureOut">
               <a:rPr lang="en-US" smtClean="0"/>
-              <a:t>3/26/2014</a:t>
+              <a:t>6/11/2015</a:t>
             </a:fld>
             <a:endParaRPr lang="en-US"/>
           </a:p>
@@ -4097,7 +4097,7 @@
           <a:p>
             <a:fld id="{699DC775-C286-4358-8C92-D7E584E969B3}" type="datetimeFigureOut">
               <a:rPr lang="en-US" smtClean="0"/>
-              <a:t>3/26/2014</a:t>
+              <a:t>6/11/2015</a:t>
             </a:fld>
             <a:endParaRPr lang="en-US"/>
           </a:p>
@@ -4351,7 +4351,7 @@
           <a:p>
             <a:fld id="{699DC775-C286-4358-8C92-D7E584E969B3}" type="datetimeFigureOut">
               <a:rPr lang="en-US" smtClean="0"/>
-              <a:t>3/26/2014</a:t>
+              <a:t>6/11/2015</a:t>
             </a:fld>
             <a:endParaRPr lang="en-US"/>
           </a:p>
@@ -4647,7 +4647,7 @@
           <a:p>
             <a:fld id="{699DC775-C286-4358-8C92-D7E584E969B3}" type="datetimeFigureOut">
               <a:rPr lang="en-US" smtClean="0"/>
-              <a:t>3/26/2014</a:t>
+              <a:t>6/11/2015</a:t>
             </a:fld>
             <a:endParaRPr lang="en-US"/>
           </a:p>
@@ -5077,7 +5077,7 @@
           <a:p>
             <a:fld id="{699DC775-C286-4358-8C92-D7E584E969B3}" type="datetimeFigureOut">
               <a:rPr lang="en-US" smtClean="0"/>
-              <a:t>3/26/2014</a:t>
+              <a:t>6/11/2015</a:t>
             </a:fld>
             <a:endParaRPr lang="en-US"/>
           </a:p>
@@ -5203,7 +5203,7 @@
           <a:p>
             <a:fld id="{699DC775-C286-4358-8C92-D7E584E969B3}" type="datetimeFigureOut">
               <a:rPr lang="en-US" smtClean="0"/>
-              <a:t>3/26/2014</a:t>
+              <a:t>6/11/2015</a:t>
             </a:fld>
             <a:endParaRPr lang="en-US"/>
           </a:p>
@@ -5306,7 +5306,7 @@
           <a:p>
             <a:fld id="{699DC775-C286-4358-8C92-D7E584E969B3}" type="datetimeFigureOut">
               <a:rPr lang="en-US" smtClean="0"/>
-              <a:t>3/26/2014</a:t>
+              <a:t>6/11/2015</a:t>
             </a:fld>
             <a:endParaRPr lang="en-US"/>
           </a:p>
@@ -5552,7 +5552,7 @@
           <a:p>
             <a:fld id="{699DC775-C286-4358-8C92-D7E584E969B3}" type="datetimeFigureOut">
               <a:rPr lang="en-US" smtClean="0"/>
-              <a:t>3/26/2014</a:t>
+              <a:t>6/11/2015</a:t>
             </a:fld>
             <a:endParaRPr lang="en-US"/>
           </a:p>
@@ -5837,7 +5837,7 @@
           <a:p>
             <a:fld id="{699DC775-C286-4358-8C92-D7E584E969B3}" type="datetimeFigureOut">
               <a:rPr lang="en-US" smtClean="0"/>
-              <a:t>3/26/2014</a:t>
+              <a:t>6/11/2015</a:t>
             </a:fld>
             <a:endParaRPr lang="en-US"/>
           </a:p>
@@ -6098,7 +6098,7 @@
           <a:p>
             <a:fld id="{699DC775-C286-4358-8C92-D7E584E969B3}" type="datetimeFigureOut">
               <a:rPr lang="en-US" smtClean="0"/>
-              <a:t>3/26/2014</a:t>
+              <a:t>6/11/2015</a:t>
             </a:fld>
             <a:endParaRPr lang="en-US"/>
           </a:p>
@@ -6276,7 +6276,7 @@
           <a:p>
             <a:fld id="{699DC775-C286-4358-8C92-D7E584E969B3}" type="datetimeFigureOut">
               <a:rPr lang="en-US" smtClean="0"/>
-              <a:t>3/26/2014</a:t>
+              <a:t>6/11/2015</a:t>
             </a:fld>
             <a:endParaRPr lang="en-US"/>
           </a:p>
@@ -6464,7 +6464,7 @@
           <a:p>
             <a:fld id="{699DC775-C286-4358-8C92-D7E584E969B3}" type="datetimeFigureOut">
               <a:rPr lang="en-US" smtClean="0"/>
-              <a:t>3/26/2014</a:t>
+              <a:t>6/11/2015</a:t>
             </a:fld>
             <a:endParaRPr lang="en-US"/>
           </a:p>
@@ -6752,7 +6752,7 @@
           <a:p>
             <a:fld id="{699DC775-C286-4358-8C92-D7E584E969B3}" type="datetimeFigureOut">
               <a:rPr lang="en-US" smtClean="0"/>
-              <a:t>3/26/2014</a:t>
+              <a:t>6/11/2015</a:t>
             </a:fld>
             <a:endParaRPr lang="en-US"/>
           </a:p>
@@ -7174,7 +7174,7 @@
           <a:p>
             <a:fld id="{699DC775-C286-4358-8C92-D7E584E969B3}" type="datetimeFigureOut">
               <a:rPr lang="en-US" smtClean="0"/>
-              <a:t>3/26/2014</a:t>
+              <a:t>6/11/2015</a:t>
             </a:fld>
             <a:endParaRPr lang="en-US"/>
           </a:p>
@@ -7292,7 +7292,7 @@
           <a:p>
             <a:fld id="{699DC775-C286-4358-8C92-D7E584E969B3}" type="datetimeFigureOut">
               <a:rPr lang="en-US" smtClean="0"/>
-              <a:t>3/26/2014</a:t>
+              <a:t>6/11/2015</a:t>
             </a:fld>
             <a:endParaRPr lang="en-US"/>
           </a:p>
@@ -7387,7 +7387,7 @@
           <a:p>
             <a:fld id="{699DC775-C286-4358-8C92-D7E584E969B3}" type="datetimeFigureOut">
               <a:rPr lang="en-US" smtClean="0"/>
-              <a:t>3/26/2014</a:t>
+              <a:t>6/11/2015</a:t>
             </a:fld>
             <a:endParaRPr lang="en-US"/>
           </a:p>
@@ -7664,7 +7664,7 @@
           <a:p>
             <a:fld id="{699DC775-C286-4358-8C92-D7E584E969B3}" type="datetimeFigureOut">
               <a:rPr lang="en-US" smtClean="0"/>
-              <a:t>3/26/2014</a:t>
+              <a:t>6/11/2015</a:t>
             </a:fld>
             <a:endParaRPr lang="en-US"/>
           </a:p>
@@ -7917,7 +7917,7 @@
           <a:p>
             <a:fld id="{699DC775-C286-4358-8C92-D7E584E969B3}" type="datetimeFigureOut">
               <a:rPr lang="en-US" smtClean="0"/>
-              <a:t>3/26/2014</a:t>
+              <a:t>6/11/2015</a:t>
             </a:fld>
             <a:endParaRPr lang="en-US"/>
           </a:p>
@@ -8130,7 +8130,7 @@
           <a:p>
             <a:fld id="{699DC775-C286-4358-8C92-D7E584E969B3}" type="datetimeFigureOut">
               <a:rPr lang="en-US" smtClean="0"/>
-              <a:t>3/26/2014</a:t>
+              <a:t>6/11/2015</a:t>
             </a:fld>
             <a:endParaRPr lang="en-US"/>
           </a:p>
@@ -8645,7 +8645,7 @@
           <a:p>
             <a:fld id="{699DC775-C286-4358-8C92-D7E584E969B3}" type="datetimeFigureOut">
               <a:rPr lang="en-US" smtClean="0"/>
-              <a:t>3/26/2014</a:t>
+              <a:t>6/11/2015</a:t>
             </a:fld>
             <a:endParaRPr lang="en-US"/>
           </a:p>
@@ -9158,7 +9158,7 @@
           <a:p>
             <a:fld id="{699DC775-C286-4358-8C92-D7E584E969B3}" type="datetimeFigureOut">
               <a:rPr lang="en-US" smtClean="0"/>
-              <a:t>3/26/2014</a:t>
+              <a:t>6/11/2015</a:t>
             </a:fld>
             <a:endParaRPr lang="en-US"/>
           </a:p>
@@ -9821,15 +9821,7 @@
                   <a:schemeClr val="bg1"/>
                 </a:solidFill>
               </a:rPr>
-              <a:t>Right click </a:t>
-            </a:r>
-            <a:r>
-              <a:rPr lang="en-US" sz="2400" dirty="0" smtClean="0">
-                <a:solidFill>
-                  <a:schemeClr val="bg1"/>
-                </a:solidFill>
-              </a:rPr>
-              <a:t>the </a:t>
+              <a:t>Right click the </a:t>
             </a:r>
             <a:r>
               <a:rPr lang="en-US" sz="2400" b="1" dirty="0" smtClean="0">
@@ -9845,21 +9837,8 @@
                   <a:schemeClr val="bg1"/>
                 </a:solidFill>
               </a:rPr>
-              <a:t>and click ‘Convert to Picture’ button in the context menu</a:t>
-            </a:r>
-            <a:r>
-              <a:rPr lang="en-US" sz="2400" dirty="0" smtClean="0">
-                <a:solidFill>
-                  <a:schemeClr val="bg1"/>
-                </a:solidFill>
-              </a:rPr>
-              <a:t>.</a:t>
-            </a:r>
-            <a:endParaRPr lang="en-US" sz="2400" dirty="0" smtClean="0">
-              <a:solidFill>
-                <a:schemeClr val="bg1"/>
-              </a:solidFill>
-            </a:endParaRPr>
+              <a:t>and click ‘Convert to Picture’ button in the context menu.</a:t>
+            </a:r>
           </a:p>
           <a:p>
             <a:pPr marL="285750" indent="-285750">
@@ -9931,11 +9910,7 @@
           <a:p>
             <a:r>
               <a:rPr lang="en-US" dirty="0" smtClean="0"/>
-              <a:t>Convert to Picture:: </a:t>
-            </a:r>
-            <a:r>
-              <a:rPr lang="en-US" dirty="0" smtClean="0"/>
-              <a:t>normal case</a:t>
+              <a:t>Convert to Picture:: normal case</a:t>
             </a:r>
             <a:endParaRPr lang="en-SG" dirty="0"/>
           </a:p>
@@ -10090,15 +10065,7 @@
                   <a:schemeClr val="accent1"/>
                 </a:solidFill>
               </a:rPr>
-              <a:t>Expected </a:t>
-            </a:r>
-            <a:r>
-              <a:rPr lang="en-US" sz="2800" b="1" dirty="0" smtClean="0">
-                <a:solidFill>
-                  <a:schemeClr val="accent1"/>
-                </a:solidFill>
-              </a:rPr>
-              <a:t>Output (a picture object)</a:t>
+              <a:t>Expected Output (a picture object)</a:t>
             </a:r>
             <a:endParaRPr lang="en-SG" sz="2800" b="1" dirty="0">
               <a:solidFill>
@@ -10225,7 +10192,7 @@
       </p:grpSpPr>
       <p:grpSp>
         <p:nvGrpSpPr>
-          <p:cNvPr id="4" name="组合 3"/>
+          <p:cNvPr id="4" name="pic"/>
           <p:cNvGrpSpPr/>
           <p:nvPr/>
         </p:nvGrpSpPr>
@@ -10682,15 +10649,7 @@
                   <a:schemeClr val="accent1"/>
                 </a:solidFill>
               </a:rPr>
-              <a:t>Expected </a:t>
-            </a:r>
-            <a:r>
-              <a:rPr lang="en-US" sz="2800" b="1" dirty="0" smtClean="0">
-                <a:solidFill>
-                  <a:schemeClr val="accent1"/>
-                </a:solidFill>
-              </a:rPr>
-              <a:t>Output (a picture object)</a:t>
+              <a:t>Expected Output (a picture object)</a:t>
             </a:r>
             <a:endParaRPr lang="en-SG" sz="2800" b="1" dirty="0">
               <a:solidFill>

</xml_diff>